<commit_message>
Updated the presentation and read me file
</commit_message>
<xml_diff>
--- a/Presentation on Decentralized Exchange.pptx
+++ b/Presentation on Decentralized Exchange.pptx
@@ -7723,34 +7723,6 @@
           </a:p>
         </p:txBody>
       </p:sp>
-      <p:sp>
-        <p:nvSpPr>
-          <p:cNvPr id="3" name="Text Placeholder 2">
-            <a:extLst>
-              <a:ext uri="{FF2B5EF4-FFF2-40B4-BE49-F238E27FC236}">
-                <a16:creationId xmlns:a16="http://schemas.microsoft.com/office/drawing/2014/main" id="{F04AB06B-1670-BE4B-CE5C-89EC9F2BA21E}"/>
-              </a:ext>
-            </a:extLst>
-          </p:cNvPr>
-          <p:cNvSpPr>
-            <a:spLocks noGrp="1"/>
-          </p:cNvSpPr>
-          <p:nvPr>
-            <p:ph type="body" idx="1"/>
-          </p:nvPr>
-        </p:nvSpPr>
-        <p:spPr/>
-        <p:txBody>
-          <a:bodyPr/>
-          <a:lstStyle/>
-          <a:p>
-            <a:pPr marL="146050" indent="0">
-              <a:buNone/>
-            </a:pPr>
-            <a:endParaRPr lang="en-AU" dirty="0"/>
-          </a:p>
-        </p:txBody>
-      </p:sp>
       <p:pic>
         <p:nvPicPr>
           <p:cNvPr id="5" name="Picture 4" descr="Graphical user interface, text, application, email&#10;&#10;Description automatically generated">
@@ -7783,10 +7755,10 @@
       </p:pic>
       <p:pic>
         <p:nvPicPr>
-          <p:cNvPr id="7" name="Picture 6" descr="Text&#10;&#10;Description automatically generated">
+          <p:cNvPr id="9" name="Picture 8" descr="Graphical user interface, text, application, email&#10;&#10;Description automatically generated">
             <a:extLst>
               <a:ext uri="{FF2B5EF4-FFF2-40B4-BE49-F238E27FC236}">
-                <a16:creationId xmlns:a16="http://schemas.microsoft.com/office/drawing/2014/main" id="{8E959797-15BD-53F1-A37C-770AC9FC2503}"/>
+                <a16:creationId xmlns:a16="http://schemas.microsoft.com/office/drawing/2014/main" id="{A2C43911-BCC6-0AA7-F31D-8B6E12A53CC7}"/>
               </a:ext>
             </a:extLst>
           </p:cNvPr>
@@ -7803,8 +7775,8 @@
         </p:blipFill>
         <p:spPr>
           <a:xfrm>
-            <a:off x="4431323" y="1950927"/>
-            <a:ext cx="4542955" cy="2572214"/>
+            <a:off x="4460958" y="1940311"/>
+            <a:ext cx="4334933" cy="2393869"/>
           </a:xfrm>
           <a:prstGeom prst="rect">
             <a:avLst/>
@@ -7866,7 +7838,7 @@
           <a:p>
             <a:r>
               <a:rPr lang="en-AU" dirty="0"/>
-              <a:t>DEMO PROCESS – ADMINS</a:t>
+              <a:t>Demo Process – Admins</a:t>
             </a:r>
           </a:p>
         </p:txBody>
@@ -8023,7 +7995,7 @@
           <a:p>
             <a:r>
               <a:rPr lang="en-AU" dirty="0"/>
-              <a:t>DEMO PROCESS – USERS – FUND MANAGEMENT</a:t>
+              <a:t>Demo Process – Users – Fund Management</a:t>
             </a:r>
           </a:p>
         </p:txBody>
@@ -8377,7 +8349,7 @@
           <a:p>
             <a:r>
               <a:rPr lang="en-AU" dirty="0"/>
-              <a:t>DEMO PROCESS – USERS – TOKEN TRADING</a:t>
+              <a:t>Demo Process – Users – Token Trading</a:t>
             </a:r>
           </a:p>
         </p:txBody>
@@ -8592,7 +8564,7 @@
           <a:p>
             <a:r>
               <a:rPr lang="en-AU" dirty="0"/>
-              <a:t>FUTURE WORK - DEBUGGING</a:t>
+              <a:t>Future Work - Debugging</a:t>
             </a:r>
           </a:p>
         </p:txBody>
@@ -8707,7 +8679,7 @@
           <a:p>
             <a:r>
               <a:rPr lang="en-AU" dirty="0"/>
-              <a:t>FUTURE WORK – ADDING NEW FEATURES</a:t>
+              <a:t>Future Work – Adding New Features</a:t>
             </a:r>
           </a:p>
         </p:txBody>
@@ -8849,7 +8821,7 @@
           <a:p>
             <a:r>
               <a:rPr lang="en-AU" dirty="0"/>
-              <a:t>FUTURE WORK – UI OPTIMIZATION</a:t>
+              <a:t>Future Work – UI Optimization</a:t>
             </a:r>
           </a:p>
         </p:txBody>
@@ -9183,7 +9155,7 @@
           <a:p>
             <a:r>
               <a:rPr lang="en-AU" dirty="0"/>
-              <a:t>FUTURE WORK – OTHER FRONT END SUPPORTED</a:t>
+              <a:t>Future Work – Other Front End Supported</a:t>
             </a:r>
           </a:p>
         </p:txBody>
@@ -9823,7 +9795,7 @@
           <a:p>
             <a:r>
               <a:rPr lang="en-AU" dirty="0"/>
-              <a:t>WORKFLOW</a:t>
+              <a:t>Workflow</a:t>
             </a:r>
           </a:p>
         </p:txBody>
@@ -9913,7 +9885,7 @@
           <a:p>
             <a:r>
               <a:rPr lang="en-AU" dirty="0"/>
-              <a:t>FUNCTIONS OF THE DEX</a:t>
+              <a:t>Functions Of The DEX</a:t>
             </a:r>
           </a:p>
         </p:txBody>
@@ -10383,7 +10355,7 @@
           <a:p>
             <a:r>
               <a:rPr lang="en-AU" dirty="0"/>
-              <a:t>DATA TYPES</a:t>
+              <a:t>Data Types</a:t>
             </a:r>
           </a:p>
         </p:txBody>
@@ -10587,7 +10559,7 @@
           <a:p>
             <a:r>
               <a:rPr lang="en-AU" dirty="0"/>
-              <a:t>DATA TYPES</a:t>
+              <a:t>Data Types</a:t>
             </a:r>
           </a:p>
         </p:txBody>

</xml_diff>